<commit_message>
Added info about gitlab
</commit_message>
<xml_diff>
--- a/Preparing Mathematicians for Data Science Careers - 2.pptx
+++ b/Preparing Mathematicians for Data Science Careers - 2.pptx
@@ -24036,7 +24036,9 @@
         </p:nvSpPr>
         <p:spPr/>
         <p:txBody>
-          <a:bodyPr/>
+          <a:bodyPr>
+            <a:normAutofit/>
+          </a:bodyPr>
           <a:lstStyle/>
           <a:p>
             <a:r>
@@ -24048,36 +24050,90 @@
             <a:endParaRPr lang="en-US"/>
           </a:p>
           <a:p>
-            <a:endParaRPr lang="en-US" smtClean="0"/>
-          </a:p>
-          <a:p>
-            <a:endParaRPr lang="en-US"/>
-          </a:p>
-          <a:p>
-            <a:endParaRPr lang="en-US" smtClean="0"/>
-          </a:p>
-          <a:p>
-            <a:endParaRPr lang="en-US"/>
-          </a:p>
-          <a:p>
-            <a:r>
-              <a:rPr lang="en-US" smtClean="0"/>
-              <a:t>Thanks to Drew Conway for making his venn diagram available via Creative Commons. </a:t>
+            <a:r>
+              <a:rPr lang="en-US"/>
+              <a:t>Code samples from here can be found at </a:t>
+            </a:r>
+            <a:r>
+              <a:rPr lang="en-US">
+                <a:hlinkClick r:id="rId2"/>
+              </a:rPr>
+              <a:t>https</a:t>
+            </a:r>
+            <a:r>
+              <a:rPr lang="en-US">
+                <a:hlinkClick r:id="rId2"/>
+              </a:rPr>
+              <a:t>://</a:t>
             </a:r>
             <a:r>
               <a:rPr lang="en-US" smtClean="0">
                 <a:hlinkClick r:id="rId2"/>
               </a:rPr>
+              <a:t>github.com/paulraff/2016JointMeetings</a:t>
+            </a:r>
+            <a:endParaRPr lang="en-US" smtClean="0"/>
+          </a:p>
+          <a:p>
+            <a:endParaRPr lang="en-US"/>
+          </a:p>
+          <a:p>
+            <a:endParaRPr lang="en-US" smtClean="0"/>
+          </a:p>
+          <a:p>
+            <a:endParaRPr lang="en-US"/>
+          </a:p>
+          <a:p>
+            <a:r>
+              <a:rPr lang="en-US" smtClean="0"/>
+              <a:t>Thanks to Drew Conway for making his venn diagram available via Creative Commons. </a:t>
+            </a:r>
+            <a:r>
+              <a:rPr lang="en-US" smtClean="0">
+                <a:hlinkClick r:id="rId3"/>
+              </a:rPr>
               <a:t>License information</a:t>
             </a:r>
             <a:r>
               <a:rPr lang="en-US" smtClean="0"/>
               <a:t>.</a:t>
             </a:r>
+          </a:p>
+          <a:p>
             <a:endParaRPr lang="en-US"/>
           </a:p>
         </p:txBody>
       </p:sp>
+      <p:pic>
+        <p:nvPicPr>
+          <p:cNvPr id="4" name="Picture 3"/>
+          <p:cNvPicPr>
+            <a:picLocks noChangeAspect="1"/>
+          </p:cNvPicPr>
+          <p:nvPr/>
+        </p:nvPicPr>
+        <p:blipFill>
+          <a:blip r:embed="rId4" cstate="print">
+            <a:extLst>
+              <a:ext uri="{28A0092B-C50C-407E-A947-70E740481C1C}">
+                <a14:useLocalDpi xmlns:a14="http://schemas.microsoft.com/office/drawing/2010/main" val="0"/>
+              </a:ext>
+            </a:extLst>
+          </a:blip>
+          <a:stretch>
+            <a:fillRect/>
+          </a:stretch>
+        </p:blipFill>
+        <p:spPr>
+          <a:xfrm>
+            <a:off x="0" y="6178113"/>
+            <a:ext cx="1208689" cy="679887"/>
+          </a:xfrm>
+          <a:prstGeom prst="rect">
+            <a:avLst/>
+          </a:prstGeom>
+        </p:spPr>
+      </p:pic>
     </p:spTree>
     <p:extLst>
       <p:ext uri="{BB962C8B-B14F-4D97-AF65-F5344CB8AC3E}">

</xml_diff>